<commit_message>
Inicio Análisis de Riesgos
</commit_message>
<xml_diff>
--- a/1erSeminario.pptx
+++ b/1erSeminario.pptx
@@ -7,8 +7,10 @@
   <p:sldIdLst>
     <p:sldId id="256" r:id="rId2"/>
     <p:sldId id="257" r:id="rId3"/>
-    <p:sldId id="258" r:id="rId4"/>
-    <p:sldId id="259" r:id="rId5"/>
+    <p:sldId id="261" r:id="rId4"/>
+    <p:sldId id="258" r:id="rId5"/>
+    <p:sldId id="259" r:id="rId6"/>
+    <p:sldId id="260" r:id="rId7"/>
   </p:sldIdLst>
   <p:sldSz cx="12192000" cy="6858000"/>
   <p:notesSz cx="6858000" cy="9144000"/>
@@ -107,6 +109,11 @@
       </a:defRPr>
     </a:lvl9pPr>
   </p:defaultTextStyle>
+  <p:extLst>
+    <p:ext uri="{EFAFB233-063F-42B5-8137-9DF3F51BA10A}">
+      <p15:sldGuideLst xmlns:p15="http://schemas.microsoft.com/office/powerpoint/2012/main"/>
+    </p:ext>
+  </p:extLst>
 </p:presentation>
 </file>
 
@@ -441,7 +448,7 @@
           <a:p>
             <a:fld id="{2A897075-88DA-4059-B967-B85F2EA5BC40}" type="datetimeFigureOut">
               <a:rPr lang="es-MX" smtClean="0"/>
-              <a:t>05/10/2015</a:t>
+              <a:t>06/10/2015</a:t>
             </a:fld>
             <a:endParaRPr lang="es-MX"/>
           </a:p>
@@ -765,7 +772,7 @@
           <a:p>
             <a:fld id="{2A897075-88DA-4059-B967-B85F2EA5BC40}" type="datetimeFigureOut">
               <a:rPr lang="es-MX" smtClean="0"/>
-              <a:t>05/10/2015</a:t>
+              <a:t>06/10/2015</a:t>
             </a:fld>
             <a:endParaRPr lang="es-MX"/>
           </a:p>
@@ -1013,7 +1020,7 @@
           <a:p>
             <a:fld id="{2A897075-88DA-4059-B967-B85F2EA5BC40}" type="datetimeFigureOut">
               <a:rPr lang="es-MX" smtClean="0"/>
-              <a:t>05/10/2015</a:t>
+              <a:t>06/10/2015</a:t>
             </a:fld>
             <a:endParaRPr lang="es-MX"/>
           </a:p>
@@ -1352,7 +1359,7 @@
           <a:p>
             <a:fld id="{2A897075-88DA-4059-B967-B85F2EA5BC40}" type="datetimeFigureOut">
               <a:rPr lang="es-MX" smtClean="0"/>
-              <a:t>05/10/2015</a:t>
+              <a:t>06/10/2015</a:t>
             </a:fld>
             <a:endParaRPr lang="es-MX"/>
           </a:p>
@@ -1699,7 +1706,7 @@
           <a:p>
             <a:fld id="{2A897075-88DA-4059-B967-B85F2EA5BC40}" type="datetimeFigureOut">
               <a:rPr lang="es-MX" smtClean="0"/>
-              <a:t>05/10/2015</a:t>
+              <a:t>06/10/2015</a:t>
             </a:fld>
             <a:endParaRPr lang="es-MX"/>
           </a:p>
@@ -2073,7 +2080,7 @@
           <a:p>
             <a:fld id="{2A897075-88DA-4059-B967-B85F2EA5BC40}" type="datetimeFigureOut">
               <a:rPr lang="es-MX" smtClean="0"/>
-              <a:t>05/10/2015</a:t>
+              <a:t>06/10/2015</a:t>
             </a:fld>
             <a:endParaRPr lang="es-MX"/>
           </a:p>
@@ -2543,7 +2550,7 @@
           <a:p>
             <a:fld id="{2A897075-88DA-4059-B967-B85F2EA5BC40}" type="datetimeFigureOut">
               <a:rPr lang="es-MX" smtClean="0"/>
-              <a:t>05/10/2015</a:t>
+              <a:t>06/10/2015</a:t>
             </a:fld>
             <a:endParaRPr lang="es-MX"/>
           </a:p>
@@ -2748,7 +2755,7 @@
           <a:p>
             <a:fld id="{2A897075-88DA-4059-B967-B85F2EA5BC40}" type="datetimeFigureOut">
               <a:rPr lang="es-MX" smtClean="0"/>
-              <a:t>05/10/2015</a:t>
+              <a:t>06/10/2015</a:t>
             </a:fld>
             <a:endParaRPr lang="es-MX"/>
           </a:p>
@@ -2959,7 +2966,7 @@
           <a:p>
             <a:fld id="{2A897075-88DA-4059-B967-B85F2EA5BC40}" type="datetimeFigureOut">
               <a:rPr lang="es-MX" smtClean="0"/>
-              <a:t>05/10/2015</a:t>
+              <a:t>06/10/2015</a:t>
             </a:fld>
             <a:endParaRPr lang="es-MX"/>
           </a:p>
@@ -3191,7 +3198,7 @@
           <a:p>
             <a:fld id="{2A897075-88DA-4059-B967-B85F2EA5BC40}" type="datetimeFigureOut">
               <a:rPr lang="es-MX" smtClean="0"/>
-              <a:t>05/10/2015</a:t>
+              <a:t>06/10/2015</a:t>
             </a:fld>
             <a:endParaRPr lang="es-MX"/>
           </a:p>
@@ -3439,7 +3446,7 @@
           <a:p>
             <a:fld id="{2A897075-88DA-4059-B967-B85F2EA5BC40}" type="datetimeFigureOut">
               <a:rPr lang="es-MX" smtClean="0"/>
-              <a:t>05/10/2015</a:t>
+              <a:t>06/10/2015</a:t>
             </a:fld>
             <a:endParaRPr lang="es-MX"/>
           </a:p>
@@ -3737,7 +3744,7 @@
           <a:p>
             <a:fld id="{2A897075-88DA-4059-B967-B85F2EA5BC40}" type="datetimeFigureOut">
               <a:rPr lang="es-MX" smtClean="0"/>
-              <a:t>05/10/2015</a:t>
+              <a:t>06/10/2015</a:t>
             </a:fld>
             <a:endParaRPr lang="es-MX"/>
           </a:p>
@@ -4131,7 +4138,7 @@
           <a:p>
             <a:fld id="{2A897075-88DA-4059-B967-B85F2EA5BC40}" type="datetimeFigureOut">
               <a:rPr lang="es-MX" smtClean="0"/>
-              <a:t>05/10/2015</a:t>
+              <a:t>06/10/2015</a:t>
             </a:fld>
             <a:endParaRPr lang="es-MX"/>
           </a:p>
@@ -4280,7 +4287,7 @@
           <a:p>
             <a:fld id="{2A897075-88DA-4059-B967-B85F2EA5BC40}" type="datetimeFigureOut">
               <a:rPr lang="es-MX" smtClean="0"/>
-              <a:t>05/10/2015</a:t>
+              <a:t>06/10/2015</a:t>
             </a:fld>
             <a:endParaRPr lang="es-MX"/>
           </a:p>
@@ -4406,7 +4413,7 @@
           <a:p>
             <a:fld id="{2A897075-88DA-4059-B967-B85F2EA5BC40}" type="datetimeFigureOut">
               <a:rPr lang="es-MX" smtClean="0"/>
-              <a:t>05/10/2015</a:t>
+              <a:t>06/10/2015</a:t>
             </a:fld>
             <a:endParaRPr lang="es-MX"/>
           </a:p>
@@ -4661,7 +4668,7 @@
           <a:p>
             <a:fld id="{2A897075-88DA-4059-B967-B85F2EA5BC40}" type="datetimeFigureOut">
               <a:rPr lang="es-MX" smtClean="0"/>
-              <a:t>05/10/2015</a:t>
+              <a:t>06/10/2015</a:t>
             </a:fld>
             <a:endParaRPr lang="es-MX"/>
           </a:p>
@@ -4976,7 +4983,7 @@
           <a:p>
             <a:fld id="{2A897075-88DA-4059-B967-B85F2EA5BC40}" type="datetimeFigureOut">
               <a:rPr lang="es-MX" smtClean="0"/>
-              <a:t>05/10/2015</a:t>
+              <a:t>06/10/2015</a:t>
             </a:fld>
             <a:endParaRPr lang="es-MX"/>
           </a:p>
@@ -5327,7 +5334,7 @@
           <a:p>
             <a:fld id="{2A897075-88DA-4059-B967-B85F2EA5BC40}" type="datetimeFigureOut">
               <a:rPr lang="es-MX" smtClean="0"/>
-              <a:t>05/10/2015</a:t>
+              <a:t>06/10/2015</a:t>
             </a:fld>
             <a:endParaRPr lang="es-MX"/>
           </a:p>
@@ -5889,7 +5896,6 @@
               <a:rPr lang="es-MX" sz="4800" dirty="0"/>
               <a:t>Plataforma Social Móvil de Servicios al Consumidor</a:t>
             </a:r>
-            <a:endParaRPr lang="es-MX" sz="4800" dirty="0"/>
           </a:p>
         </p:txBody>
       </p:sp>
@@ -6087,22 +6093,6 @@
           <a:bodyPr/>
           <a:lstStyle/>
           <a:p>
-            <a:r>
-              <a:rPr lang="es-ES" dirty="0"/>
-              <a:t>Con base </a:t>
-            </a:r>
-            <a:r>
-              <a:rPr lang="es-ES" dirty="0" smtClean="0"/>
-              <a:t>en </a:t>
-            </a:r>
-            <a:r>
-              <a:rPr lang="es-ES" dirty="0"/>
-              <a:t>la problemática, se propone una plataforma social que permita a los consumidores ayudarse mutuamente compartiendo y consultando virtualmente los precios y productos de diferentes establecimientos en su ciudad o localidad. El potencial de la aplicación es que se podría consultar información en tiempo real, y con la ayuda de la geolocalización podrían también saber en dónde se ubican los establecimientos correspondientes a dichos </a:t>
-            </a:r>
-            <a:r>
-              <a:rPr lang="es-ES" dirty="0" smtClean="0"/>
-              <a:t>productos</a:t>
-            </a:r>
             <a:endParaRPr lang="es-MX" dirty="0"/>
           </a:p>
         </p:txBody>
@@ -6110,7 +6100,7 @@
     </p:spTree>
     <p:extLst>
       <p:ext uri="{BB962C8B-B14F-4D97-AF65-F5344CB8AC3E}">
-        <p14:creationId xmlns:p14="http://schemas.microsoft.com/office/powerpoint/2010/main" val="3298406115"/>
+        <p14:creationId xmlns:p14="http://schemas.microsoft.com/office/powerpoint/2010/main" val="1352033560"/>
       </p:ext>
     </p:extLst>
   </p:cSld>
@@ -6154,7 +6144,7 @@
           <a:p>
             <a:r>
               <a:rPr lang="es-MX" dirty="0" smtClean="0"/>
-              <a:t>Objetivos</a:t>
+              <a:t>Solución Propuesta</a:t>
             </a:r>
             <a:endParaRPr lang="es-MX" dirty="0"/>
           </a:p>
@@ -6175,7 +6165,131 @@
           <a:bodyPr/>
           <a:lstStyle/>
           <a:p>
+            <a:r>
+              <a:rPr lang="es-ES" dirty="0"/>
+              <a:t>Con base </a:t>
+            </a:r>
+            <a:r>
+              <a:rPr lang="es-ES" dirty="0" smtClean="0"/>
+              <a:t>en </a:t>
+            </a:r>
+            <a:r>
+              <a:rPr lang="es-ES" dirty="0"/>
+              <a:t>la problemática, se propone una plataforma social que permita a los consumidores ayudarse mutuamente compartiendo y consultando virtualmente los precios y productos de diferentes establecimientos en su ciudad o localidad. El potencial de la aplicación es que se podría consultar información en tiempo real, y con la ayuda de la geolocalización podrían también saber en dónde se ubican los establecimientos correspondientes a dichos </a:t>
+            </a:r>
+            <a:r>
+              <a:rPr lang="es-ES" dirty="0" smtClean="0"/>
+              <a:t>productos</a:t>
+            </a:r>
             <a:endParaRPr lang="es-MX" dirty="0"/>
+          </a:p>
+        </p:txBody>
+      </p:sp>
+    </p:spTree>
+    <p:extLst>
+      <p:ext uri="{BB962C8B-B14F-4D97-AF65-F5344CB8AC3E}">
+        <p14:creationId xmlns:p14="http://schemas.microsoft.com/office/powerpoint/2010/main" val="3298406115"/>
+      </p:ext>
+    </p:extLst>
+  </p:cSld>
+  <p:clrMapOvr>
+    <a:masterClrMapping/>
+  </p:clrMapOvr>
+</p:sld>
+</file>
+
+<file path=ppt/slides/slide5.xml><?xml version="1.0" encoding="utf-8"?>
+<p:sld xmlns:a="http://schemas.openxmlformats.org/drawingml/2006/main" xmlns:r="http://schemas.openxmlformats.org/officeDocument/2006/relationships" xmlns:p="http://schemas.openxmlformats.org/presentationml/2006/main">
+  <p:cSld>
+    <p:spTree>
+      <p:nvGrpSpPr>
+        <p:cNvPr id="1" name=""/>
+        <p:cNvGrpSpPr/>
+        <p:nvPr/>
+      </p:nvGrpSpPr>
+      <p:grpSpPr>
+        <a:xfrm>
+          <a:off x="0" y="0"/>
+          <a:ext cx="0" cy="0"/>
+          <a:chOff x="0" y="0"/>
+          <a:chExt cx="0" cy="0"/>
+        </a:xfrm>
+      </p:grpSpPr>
+      <p:sp>
+        <p:nvSpPr>
+          <p:cNvPr id="2" name="Título 1"/>
+          <p:cNvSpPr>
+            <a:spLocks noGrp="1"/>
+          </p:cNvSpPr>
+          <p:nvPr>
+            <p:ph type="title"/>
+          </p:nvPr>
+        </p:nvSpPr>
+        <p:spPr/>
+        <p:txBody>
+          <a:bodyPr/>
+          <a:lstStyle/>
+          <a:p>
+            <a:r>
+              <a:rPr lang="es-MX" dirty="0" smtClean="0"/>
+              <a:t>Objetivo</a:t>
+            </a:r>
+            <a:endParaRPr lang="es-MX" dirty="0"/>
+          </a:p>
+        </p:txBody>
+      </p:sp>
+      <p:sp>
+        <p:nvSpPr>
+          <p:cNvPr id="3" name="Marcador de contenido 2"/>
+          <p:cNvSpPr>
+            <a:spLocks noGrp="1"/>
+          </p:cNvSpPr>
+          <p:nvPr>
+            <p:ph idx="1"/>
+          </p:nvPr>
+        </p:nvSpPr>
+        <p:spPr/>
+        <p:txBody>
+          <a:bodyPr/>
+          <a:lstStyle/>
+          <a:p>
+            <a:r>
+              <a:rPr lang="es-ES" dirty="0">
+                <a:solidFill>
+                  <a:schemeClr val="tx1"/>
+                </a:solidFill>
+              </a:rPr>
+              <a:t>A</a:t>
+            </a:r>
+            <a:r>
+              <a:rPr lang="es-ES" dirty="0" smtClean="0">
+                <a:solidFill>
+                  <a:schemeClr val="tx1"/>
+                </a:solidFill>
+              </a:rPr>
+              <a:t>nalizar</a:t>
+            </a:r>
+            <a:r>
+              <a:rPr lang="es-ES" dirty="0">
+                <a:solidFill>
+                  <a:schemeClr val="tx1"/>
+                </a:solidFill>
+              </a:rPr>
+              <a:t>, diseñar y desarrollar una plataforma de apoyo a consumidores de productos y servicios, que permita por medio de un esquema de colaboración el comparar productos y servicios de diferentes proveedores, así como comparar los precios en diferentes tiendas ofreciendo además a los usuarios una gratificación por la colaboración al </a:t>
+            </a:r>
+            <a:r>
+              <a:rPr lang="es-ES" dirty="0" smtClean="0">
+                <a:solidFill>
+                  <a:schemeClr val="tx1"/>
+                </a:solidFill>
+              </a:rPr>
+              <a:t>sistema.</a:t>
+            </a:r>
+            <a:endParaRPr lang="es-MX" dirty="0" smtClean="0">
+              <a:solidFill>
+                <a:schemeClr val="tx1"/>
+              </a:solidFill>
+            </a:endParaRPr>
           </a:p>
         </p:txBody>
       </p:sp>
@@ -6183,6 +6297,78 @@
     <p:extLst>
       <p:ext uri="{BB962C8B-B14F-4D97-AF65-F5344CB8AC3E}">
         <p14:creationId xmlns:p14="http://schemas.microsoft.com/office/powerpoint/2010/main" val="3496131479"/>
+      </p:ext>
+    </p:extLst>
+  </p:cSld>
+  <p:clrMapOvr>
+    <a:masterClrMapping/>
+  </p:clrMapOvr>
+</p:sld>
+</file>
+
+<file path=ppt/slides/slide6.xml><?xml version="1.0" encoding="utf-8"?>
+<p:sld xmlns:a="http://schemas.openxmlformats.org/drawingml/2006/main" xmlns:r="http://schemas.openxmlformats.org/officeDocument/2006/relationships" xmlns:p="http://schemas.openxmlformats.org/presentationml/2006/main">
+  <p:cSld>
+    <p:spTree>
+      <p:nvGrpSpPr>
+        <p:cNvPr id="1" name=""/>
+        <p:cNvGrpSpPr/>
+        <p:nvPr/>
+      </p:nvGrpSpPr>
+      <p:grpSpPr>
+        <a:xfrm>
+          <a:off x="0" y="0"/>
+          <a:ext cx="0" cy="0"/>
+          <a:chOff x="0" y="0"/>
+          <a:chExt cx="0" cy="0"/>
+        </a:xfrm>
+      </p:grpSpPr>
+      <p:sp>
+        <p:nvSpPr>
+          <p:cNvPr id="2" name="Título 1"/>
+          <p:cNvSpPr>
+            <a:spLocks noGrp="1"/>
+          </p:cNvSpPr>
+          <p:nvPr>
+            <p:ph type="title"/>
+          </p:nvPr>
+        </p:nvSpPr>
+        <p:spPr/>
+        <p:txBody>
+          <a:bodyPr/>
+          <a:lstStyle/>
+          <a:p>
+            <a:r>
+              <a:rPr lang="es-MX" dirty="0" smtClean="0"/>
+              <a:t>Estado del Arte</a:t>
+            </a:r>
+            <a:endParaRPr lang="es-MX" dirty="0"/>
+          </a:p>
+        </p:txBody>
+      </p:sp>
+      <p:sp>
+        <p:nvSpPr>
+          <p:cNvPr id="3" name="Marcador de contenido 2"/>
+          <p:cNvSpPr>
+            <a:spLocks noGrp="1"/>
+          </p:cNvSpPr>
+          <p:nvPr>
+            <p:ph idx="1"/>
+          </p:nvPr>
+        </p:nvSpPr>
+        <p:spPr/>
+        <p:txBody>
+          <a:bodyPr/>
+          <a:lstStyle/>
+          <a:p>
+            <a:endParaRPr lang="es-MX"/>
+          </a:p>
+        </p:txBody>
+      </p:sp>
+    </p:spTree>
+    <p:extLst>
+      <p:ext uri="{BB962C8B-B14F-4D97-AF65-F5344CB8AC3E}">
+        <p14:creationId xmlns:p14="http://schemas.microsoft.com/office/powerpoint/2010/main" val="523673813"/>
       </p:ext>
     </p:extLst>
   </p:cSld>

</xml_diff>